<commit_message>
Updates to intro slides
</commit_message>
<xml_diff>
--- a/admin/intro_slides/hackathon_intro_slides.pptx
+++ b/admin/intro_slides/hackathon_intro_slides.pptx
@@ -15,8 +15,8 @@
     <p:sldId id="260" r:id="rId6"/>
     <p:sldId id="261" r:id="rId7"/>
     <p:sldId id="262" r:id="rId8"/>
-    <p:sldId id="270" r:id="rId9"/>
-    <p:sldId id="263" r:id="rId10"/>
+    <p:sldId id="263" r:id="rId9"/>
+    <p:sldId id="270" r:id="rId10"/>
     <p:sldId id="264" r:id="rId11"/>
     <p:sldId id="267" r:id="rId12"/>
     <p:sldId id="268" r:id="rId13"/>
@@ -322,6 +322,11 @@
       </a:defRPr>
     </a:lvl9pPr>
   </p:defaultTextStyle>
+  <p:extLst>
+    <p:ext uri="{EFAFB233-063F-42B5-8137-9DF3F51BA10A}">
+      <p15:sldGuideLst xmlns:p15="http://schemas.microsoft.com/office/powerpoint/2012/main"/>
+    </p:ext>
+  </p:extLst>
 </p:presentation>
 </file>
 
@@ -2153,7 +2158,7 @@
           </a:ln>
           <a:extLst>
             <a:ext uri="{C572A759-6A51-4108-AA02-DFA0A04FC94B}">
-              <ma14:wrappingTextBoxFlag xmlns:ma14="http://schemas.microsoft.com/office/mac/drawingml/2011/main" xmlns:a14="http://schemas.microsoft.com/office/drawing/2010/main" xmlns:m="http://schemas.openxmlformats.org/officeDocument/2006/math" xmlns="" val="1"/>
+              <ma14:wrappingTextBoxFlag xmlns="" xmlns:m="http://schemas.openxmlformats.org/officeDocument/2006/math" xmlns:a14="http://schemas.microsoft.com/office/drawing/2010/main" xmlns:ma14="http://schemas.microsoft.com/office/mac/drawingml/2011/main" val="1"/>
             </a:ext>
           </a:extLst>
         </p:spPr>
@@ -2192,7 +2197,7 @@
           </a:ln>
           <a:extLst>
             <a:ext uri="{C572A759-6A51-4108-AA02-DFA0A04FC94B}">
-              <ma14:wrappingTextBoxFlag xmlns:ma14="http://schemas.microsoft.com/office/mac/drawingml/2011/main" xmlns:a14="http://schemas.microsoft.com/office/drawing/2010/main" xmlns:m="http://schemas.openxmlformats.org/officeDocument/2006/math" xmlns="" val="1"/>
+              <ma14:wrappingTextBoxFlag xmlns="" xmlns:m="http://schemas.openxmlformats.org/officeDocument/2006/math" xmlns:a14="http://schemas.microsoft.com/office/drawing/2010/main" xmlns:ma14="http://schemas.microsoft.com/office/mac/drawingml/2011/main" val="1"/>
             </a:ext>
           </a:extLst>
         </p:spPr>
@@ -3193,7 +3198,7 @@
           </a:ln>
           <a:extLst>
             <a:ext uri="{C572A759-6A51-4108-AA02-DFA0A04FC94B}">
-              <ma14:wrappingTextBoxFlag xmlns:ma14="http://schemas.microsoft.com/office/mac/drawingml/2011/main" xmlns:a14="http://schemas.microsoft.com/office/drawing/2010/main" xmlns:m="http://schemas.openxmlformats.org/officeDocument/2006/math" xmlns="" val="1"/>
+              <ma14:wrappingTextBoxFlag xmlns="" xmlns:m="http://schemas.openxmlformats.org/officeDocument/2006/math" xmlns:a14="http://schemas.microsoft.com/office/drawing/2010/main" xmlns:ma14="http://schemas.microsoft.com/office/mac/drawingml/2011/main" val="1"/>
             </a:ext>
           </a:extLst>
         </p:spPr>
@@ -3276,7 +3281,9 @@
           </a:prstGeom>
         </p:spPr>
         <p:txBody>
-          <a:bodyPr anchor="t"/>
+          <a:bodyPr anchor="t">
+            <a:normAutofit fontScale="92500" lnSpcReduction="10000"/>
+          </a:bodyPr>
           <a:lstStyle/>
           <a:p>
             <a:pPr marL="422275" indent="-422275" defTabSz="554990">
@@ -3287,7 +3294,26 @@
             </a:pPr>
             <a:r>
               <a:rPr lang="en-US" dirty="0"/>
-              <a:t>Main activities (tutorials, Saturday night event, presentations) will take place in the main Zoom room</a:t>
+              <a:t>Main activities (tutorials, presentations) will take place in the main Zoom room</a:t>
+            </a:r>
+          </a:p>
+          <a:p>
+            <a:pPr marL="422275" indent="-422275" defTabSz="554990">
+              <a:spcBef>
+                <a:spcPts val="3900"/>
+              </a:spcBef>
+              <a:defRPr sz="3040"/>
+            </a:pPr>
+            <a:r>
+              <a:rPr lang="en-US" dirty="0"/>
+              <a:t>Saturday night event will take place in a separate Zoom room </a:t>
+            </a:r>
+            <a:br>
+              <a:rPr lang="en-US" dirty="0"/>
+            </a:br>
+            <a:r>
+              <a:rPr lang="en-US" dirty="0"/>
+              <a:t>(link will be provided on Slack)</a:t>
             </a:r>
             <a:endParaRPr dirty="0"/>
           </a:p>
@@ -3534,7 +3560,7 @@
           </a:ln>
           <a:extLst>
             <a:ext uri="{C572A759-6A51-4108-AA02-DFA0A04FC94B}">
-              <ma14:wrappingTextBoxFlag xmlns:ma14="http://schemas.microsoft.com/office/mac/drawingml/2011/main" xmlns:a14="http://schemas.microsoft.com/office/drawing/2010/main" xmlns:m="http://schemas.openxmlformats.org/officeDocument/2006/math" xmlns="" val="1"/>
+              <ma14:wrappingTextBoxFlag xmlns="" xmlns:m="http://schemas.openxmlformats.org/officeDocument/2006/math" xmlns:a14="http://schemas.microsoft.com/office/drawing/2010/main" xmlns:ma14="http://schemas.microsoft.com/office/mac/drawingml/2011/main" val="1"/>
             </a:ext>
           </a:extLst>
         </p:spPr>
@@ -3624,7 +3650,7 @@
           </a:ln>
           <a:extLst>
             <a:ext uri="{C572A759-6A51-4108-AA02-DFA0A04FC94B}">
-              <ma14:wrappingTextBoxFlag xmlns:ma14="http://schemas.microsoft.com/office/mac/drawingml/2011/main" xmlns:a14="http://schemas.microsoft.com/office/drawing/2010/main" xmlns:m="http://schemas.openxmlformats.org/officeDocument/2006/math" xmlns="" val="1"/>
+              <ma14:wrappingTextBoxFlag xmlns="" xmlns:m="http://schemas.openxmlformats.org/officeDocument/2006/math" xmlns:a14="http://schemas.microsoft.com/office/drawing/2010/main" xmlns:ma14="http://schemas.microsoft.com/office/mac/drawingml/2011/main" val="1"/>
             </a:ext>
           </a:extLst>
         </p:spPr>
@@ -3659,7 +3685,7 @@
           </a:ln>
           <a:extLst>
             <a:ext uri="{C572A759-6A51-4108-AA02-DFA0A04FC94B}">
-              <ma14:wrappingTextBoxFlag xmlns:ma14="http://schemas.microsoft.com/office/mac/drawingml/2011/main" xmlns:a14="http://schemas.microsoft.com/office/drawing/2010/main" xmlns:m="http://schemas.openxmlformats.org/officeDocument/2006/math" xmlns="" val="1"/>
+              <ma14:wrappingTextBoxFlag xmlns="" xmlns:m="http://schemas.openxmlformats.org/officeDocument/2006/math" xmlns:a14="http://schemas.microsoft.com/office/drawing/2010/main" xmlns:ma14="http://schemas.microsoft.com/office/mac/drawingml/2011/main" val="1"/>
             </a:ext>
           </a:extLst>
         </p:spPr>
@@ -4014,7 +4040,7 @@
           </a:ln>
           <a:extLst>
             <a:ext uri="{C572A759-6A51-4108-AA02-DFA0A04FC94B}">
-              <ma14:wrappingTextBoxFlag xmlns:ma14="http://schemas.microsoft.com/office/mac/drawingml/2011/main" xmlns:a14="http://schemas.microsoft.com/office/drawing/2010/main" xmlns:m="http://schemas.openxmlformats.org/officeDocument/2006/math" xmlns="" val="1"/>
+              <ma14:wrappingTextBoxFlag xmlns="" xmlns:m="http://schemas.openxmlformats.org/officeDocument/2006/math" xmlns:a14="http://schemas.microsoft.com/office/drawing/2010/main" xmlns:ma14="http://schemas.microsoft.com/office/mac/drawingml/2011/main" val="1"/>
             </a:ext>
           </a:extLst>
         </p:spPr>
@@ -4338,8 +4364,8 @@
         </p:nvSpPr>
         <p:spPr>
           <a:xfrm>
-            <a:off x="1486611" y="6244893"/>
-            <a:ext cx="10031592" cy="656590"/>
+            <a:off x="1161202" y="6244893"/>
+            <a:ext cx="10682412" cy="656590"/>
           </a:xfrm>
           <a:prstGeom prst="rect">
             <a:avLst/>
@@ -4388,7 +4414,7 @@
             </a:pPr>
             <a:r>
               <a:rPr lang="en-US" sz="3600" b="0" i="1" dirty="0"/>
-              <a:t>All participants will judging/voting on the awards</a:t>
+              <a:t>All participants will be judging/voting on the awards</a:t>
             </a:r>
             <a:endParaRPr kumimoji="0" lang="en-US" sz="3600" b="0" i="1" u="none" strike="noStrike" cap="none" spc="0" normalizeH="0" baseline="0" dirty="0">
               <a:ln>
@@ -4611,6 +4637,205 @@
       </p:grpSpPr>
       <p:sp>
         <p:nvSpPr>
+          <p:cNvPr id="146" name="Presentations"/>
+          <p:cNvSpPr txBox="1">
+            <a:spLocks noGrp="1"/>
+          </p:cNvSpPr>
+          <p:nvPr>
+            <p:ph type="title"/>
+          </p:nvPr>
+        </p:nvSpPr>
+        <p:spPr>
+          <a:prstGeom prst="rect">
+            <a:avLst/>
+          </a:prstGeom>
+        </p:spPr>
+        <p:txBody>
+          <a:bodyPr/>
+          <a:lstStyle/>
+          <a:p>
+            <a:r>
+              <a:t>Presentations</a:t>
+            </a:r>
+          </a:p>
+        </p:txBody>
+      </p:sp>
+      <p:sp>
+        <p:nvSpPr>
+          <p:cNvPr id="147" name="All teams will submit a short 2 - 3 page PDF summary of their findings…"/>
+          <p:cNvSpPr txBox="1">
+            <a:spLocks noGrp="1"/>
+          </p:cNvSpPr>
+          <p:nvPr>
+            <p:ph type="body" idx="1"/>
+          </p:nvPr>
+        </p:nvSpPr>
+        <p:spPr>
+          <a:prstGeom prst="rect">
+            <a:avLst/>
+          </a:prstGeom>
+        </p:spPr>
+        <p:txBody>
+          <a:bodyPr anchor="t">
+            <a:normAutofit fontScale="92500" lnSpcReduction="10000"/>
+          </a:bodyPr>
+          <a:lstStyle/>
+          <a:p>
+            <a:r>
+              <a:rPr dirty="0"/>
+              <a:t>All teams will submit a </a:t>
+            </a:r>
+            <a:r>
+              <a:rPr lang="en-US" b="1" dirty="0"/>
+              <a:t>5 page</a:t>
+            </a:r>
+            <a:r>
+              <a:rPr b="1" dirty="0"/>
+              <a:t> PDF summary</a:t>
+            </a:r>
+            <a:r>
+              <a:rPr lang="en-US" b="1" dirty="0"/>
+              <a:t> slide deck</a:t>
+            </a:r>
+            <a:r>
+              <a:rPr dirty="0"/>
+              <a:t> of their findings</a:t>
+            </a:r>
+            <a:r>
+              <a:rPr lang="en-US" dirty="0"/>
+              <a:t>:</a:t>
+            </a:r>
+          </a:p>
+          <a:p>
+            <a:pPr lvl="1">
+              <a:spcBef>
+                <a:spcPts val="0"/>
+              </a:spcBef>
+            </a:pPr>
+            <a:r>
+              <a:rPr lang="en-US" sz="2600" dirty="0"/>
+              <a:t>Slide 1: Title slide (include your team name!)</a:t>
+            </a:r>
+          </a:p>
+          <a:p>
+            <a:pPr lvl="1">
+              <a:spcBef>
+                <a:spcPts val="0"/>
+              </a:spcBef>
+            </a:pPr>
+            <a:r>
+              <a:rPr lang="en-US" sz="2600" dirty="0"/>
+              <a:t>Slide 2: Concise summary with main findings</a:t>
+            </a:r>
+          </a:p>
+          <a:p>
+            <a:pPr lvl="1">
+              <a:spcBef>
+                <a:spcPts val="0"/>
+              </a:spcBef>
+            </a:pPr>
+            <a:r>
+              <a:rPr lang="en-US" sz="2600" dirty="0"/>
+              <a:t>Slides 3 &amp; 4: Supporting slides</a:t>
+            </a:r>
+          </a:p>
+          <a:p>
+            <a:pPr lvl="1">
+              <a:spcBef>
+                <a:spcPts val="0"/>
+              </a:spcBef>
+            </a:pPr>
+            <a:r>
+              <a:rPr lang="en-US" sz="2600" dirty="0"/>
+              <a:t>Slides 5: Wrap-up/conclusions &amp; acknowledgements</a:t>
+            </a:r>
+            <a:br>
+              <a:rPr lang="en-US" sz="2600" dirty="0"/>
+            </a:br>
+            <a:r>
+              <a:rPr lang="en-US" sz="2600" dirty="0"/>
+              <a:t>               be sure to include reference to the data set</a:t>
+            </a:r>
+            <a:endParaRPr sz="2600" dirty="0"/>
+          </a:p>
+          <a:p>
+            <a:r>
+              <a:rPr dirty="0"/>
+              <a:t>Teams will </a:t>
+            </a:r>
+            <a:r>
+              <a:rPr lang="en-US" dirty="0"/>
+              <a:t>choose one presenter and </a:t>
+            </a:r>
+            <a:r>
+              <a:rPr dirty="0"/>
+              <a:t>have </a:t>
+            </a:r>
+            <a:r>
+              <a:rPr b="1" dirty="0"/>
+              <a:t>5 minutes to present</a:t>
+            </a:r>
+            <a:r>
+              <a:rPr dirty="0"/>
+              <a:t> their work</a:t>
+            </a:r>
+          </a:p>
+          <a:p>
+            <a:r>
+              <a:rPr lang="en-US" dirty="0"/>
+              <a:t>All participants will vote on the award categories at the end</a:t>
+            </a:r>
+            <a:endParaRPr dirty="0"/>
+          </a:p>
+          <a:p>
+            <a:r>
+              <a:rPr dirty="0"/>
+              <a:t>Try to have a good idea about what you’ll be presenting by Saturday night</a:t>
+            </a:r>
+            <a:r>
+              <a:rPr lang="en-US" dirty="0"/>
+              <a:t> – </a:t>
+            </a:r>
+            <a:r>
+              <a:rPr lang="en-US" b="1" dirty="0"/>
+              <a:t>presentations are due Sunday at 1PM</a:t>
+            </a:r>
+            <a:r>
+              <a:rPr lang="en-US" dirty="0"/>
+              <a:t>!</a:t>
+            </a:r>
+            <a:endParaRPr dirty="0"/>
+          </a:p>
+        </p:txBody>
+      </p:sp>
+    </p:spTree>
+  </p:cSld>
+  <p:clrMapOvr>
+    <a:masterClrMapping/>
+  </p:clrMapOvr>
+  <p:transition spd="med"/>
+</p:sld>
+</file>
+
+<file path=ppt/slides/slide9.xml><?xml version="1.0" encoding="utf-8"?>
+<p:sld xmlns:a="http://schemas.openxmlformats.org/drawingml/2006/main" xmlns:r="http://schemas.openxmlformats.org/officeDocument/2006/relationships" xmlns:p="http://schemas.openxmlformats.org/presentationml/2006/main">
+  <p:cSld>
+    <p:spTree>
+      <p:nvGrpSpPr>
+        <p:cNvPr id="1" name=""/>
+        <p:cNvGrpSpPr/>
+        <p:nvPr/>
+      </p:nvGrpSpPr>
+      <p:grpSpPr>
+        <a:xfrm>
+          <a:off x="0" y="0"/>
+          <a:ext cx="0" cy="0"/>
+          <a:chOff x="0" y="0"/>
+          <a:chExt cx="0" cy="0"/>
+        </a:xfrm>
+      </p:grpSpPr>
+      <p:sp>
+        <p:nvSpPr>
           <p:cNvPr id="2" name="Title 1">
             <a:extLst>
               <a:ext uri="{FF2B5EF4-FFF2-40B4-BE49-F238E27FC236}">
@@ -4664,7 +4889,7 @@
         </p:spPr>
         <p:txBody>
           <a:bodyPr anchor="t">
-            <a:normAutofit lnSpcReduction="10000"/>
+            <a:normAutofit fontScale="92500" lnSpcReduction="10000"/>
           </a:bodyPr>
           <a:lstStyle/>
           <a:p>
@@ -4676,14 +4901,15 @@
             </a:pPr>
             <a:r>
               <a:rPr lang="en-US" dirty="0"/>
-              <a:t>Please join the main Zoom room at 7PM (PDT) for a short </a:t>
-            </a:r>
-            <a:br>
+              <a:t>Please join the </a:t>
+            </a:r>
+            <a:r>
+              <a:rPr lang="en-US" b="1" dirty="0"/>
+              <a:t>Saturday Night Event Zoom</a:t>
+            </a:r>
+            <a:r>
               <a:rPr lang="en-US" dirty="0"/>
-            </a:br>
-            <a:r>
-              <a:rPr lang="en-US" dirty="0"/>
-              <a:t>1 hour social/data event.</a:t>
+              <a:t> room (not the main room) at 7PM (PDT) for a short 1 hour social/data event.</a:t>
             </a:r>
           </a:p>
           <a:p>
@@ -4784,205 +5010,6 @@
         <p14:creationId xmlns:p14="http://schemas.microsoft.com/office/powerpoint/2010/main" val="3529191824"/>
       </p:ext>
     </p:extLst>
-  </p:cSld>
-  <p:clrMapOvr>
-    <a:masterClrMapping/>
-  </p:clrMapOvr>
-  <p:transition spd="med"/>
-</p:sld>
-</file>
-
-<file path=ppt/slides/slide9.xml><?xml version="1.0" encoding="utf-8"?>
-<p:sld xmlns:a="http://schemas.openxmlformats.org/drawingml/2006/main" xmlns:r="http://schemas.openxmlformats.org/officeDocument/2006/relationships" xmlns:p="http://schemas.openxmlformats.org/presentationml/2006/main">
-  <p:cSld>
-    <p:spTree>
-      <p:nvGrpSpPr>
-        <p:cNvPr id="1" name=""/>
-        <p:cNvGrpSpPr/>
-        <p:nvPr/>
-      </p:nvGrpSpPr>
-      <p:grpSpPr>
-        <a:xfrm>
-          <a:off x="0" y="0"/>
-          <a:ext cx="0" cy="0"/>
-          <a:chOff x="0" y="0"/>
-          <a:chExt cx="0" cy="0"/>
-        </a:xfrm>
-      </p:grpSpPr>
-      <p:sp>
-        <p:nvSpPr>
-          <p:cNvPr id="146" name="Presentations"/>
-          <p:cNvSpPr txBox="1">
-            <a:spLocks noGrp="1"/>
-          </p:cNvSpPr>
-          <p:nvPr>
-            <p:ph type="title"/>
-          </p:nvPr>
-        </p:nvSpPr>
-        <p:spPr>
-          <a:prstGeom prst="rect">
-            <a:avLst/>
-          </a:prstGeom>
-        </p:spPr>
-        <p:txBody>
-          <a:bodyPr/>
-          <a:lstStyle/>
-          <a:p>
-            <a:r>
-              <a:t>Presentations</a:t>
-            </a:r>
-          </a:p>
-        </p:txBody>
-      </p:sp>
-      <p:sp>
-        <p:nvSpPr>
-          <p:cNvPr id="147" name="All teams will submit a short 2 - 3 page PDF summary of their findings…"/>
-          <p:cNvSpPr txBox="1">
-            <a:spLocks noGrp="1"/>
-          </p:cNvSpPr>
-          <p:nvPr>
-            <p:ph type="body" idx="1"/>
-          </p:nvPr>
-        </p:nvSpPr>
-        <p:spPr>
-          <a:prstGeom prst="rect">
-            <a:avLst/>
-          </a:prstGeom>
-        </p:spPr>
-        <p:txBody>
-          <a:bodyPr anchor="t">
-            <a:normAutofit fontScale="92500" lnSpcReduction="10000"/>
-          </a:bodyPr>
-          <a:lstStyle/>
-          <a:p>
-            <a:r>
-              <a:rPr dirty="0"/>
-              <a:t>All teams will submit a </a:t>
-            </a:r>
-            <a:r>
-              <a:rPr lang="en-US" b="1" dirty="0"/>
-              <a:t>5 page</a:t>
-            </a:r>
-            <a:r>
-              <a:rPr b="1" dirty="0"/>
-              <a:t> PDF summary</a:t>
-            </a:r>
-            <a:r>
-              <a:rPr lang="en-US" b="1" dirty="0"/>
-              <a:t> slide deck</a:t>
-            </a:r>
-            <a:r>
-              <a:rPr dirty="0"/>
-              <a:t> of their findings</a:t>
-            </a:r>
-            <a:r>
-              <a:rPr lang="en-US" dirty="0"/>
-              <a:t>:</a:t>
-            </a:r>
-          </a:p>
-          <a:p>
-            <a:pPr lvl="1">
-              <a:spcBef>
-                <a:spcPts val="0"/>
-              </a:spcBef>
-            </a:pPr>
-            <a:r>
-              <a:rPr lang="en-US" sz="2600" dirty="0"/>
-              <a:t>Slide 1: Title slide (include your team name!)</a:t>
-            </a:r>
-          </a:p>
-          <a:p>
-            <a:pPr lvl="1">
-              <a:spcBef>
-                <a:spcPts val="0"/>
-              </a:spcBef>
-            </a:pPr>
-            <a:r>
-              <a:rPr lang="en-US" sz="2600" dirty="0"/>
-              <a:t>Slide 2: Concise summary with main findings</a:t>
-            </a:r>
-          </a:p>
-          <a:p>
-            <a:pPr lvl="1">
-              <a:spcBef>
-                <a:spcPts val="0"/>
-              </a:spcBef>
-            </a:pPr>
-            <a:r>
-              <a:rPr lang="en-US" sz="2600" dirty="0"/>
-              <a:t>Slides 3 &amp; 4: Supporting slides</a:t>
-            </a:r>
-          </a:p>
-          <a:p>
-            <a:pPr lvl="1">
-              <a:spcBef>
-                <a:spcPts val="0"/>
-              </a:spcBef>
-            </a:pPr>
-            <a:r>
-              <a:rPr lang="en-US" sz="2600" dirty="0"/>
-              <a:t>Slides 5: Wrap-up/conclusions &amp; acknowledgements</a:t>
-            </a:r>
-            <a:br>
-              <a:rPr lang="en-US" sz="2600" dirty="0"/>
-            </a:br>
-            <a:r>
-              <a:rPr lang="en-US" sz="2600" dirty="0"/>
-              <a:t>               be sure to include reference to the data set</a:t>
-            </a:r>
-            <a:endParaRPr sz="2600" dirty="0"/>
-          </a:p>
-          <a:p>
-            <a:r>
-              <a:rPr dirty="0"/>
-              <a:t>Teams will </a:t>
-            </a:r>
-            <a:r>
-              <a:rPr lang="en-US" dirty="0"/>
-              <a:t>choose one presenter and </a:t>
-            </a:r>
-            <a:r>
-              <a:rPr dirty="0"/>
-              <a:t>have </a:t>
-            </a:r>
-            <a:r>
-              <a:rPr b="1" dirty="0"/>
-              <a:t>5 minutes to present</a:t>
-            </a:r>
-            <a:r>
-              <a:rPr dirty="0"/>
-              <a:t> their work</a:t>
-            </a:r>
-          </a:p>
-          <a:p>
-            <a:r>
-              <a:rPr lang="en-US" dirty="0"/>
-              <a:t>All participants will vote on the award categories at the end</a:t>
-            </a:r>
-            <a:endParaRPr dirty="0"/>
-          </a:p>
-          <a:p>
-            <a:r>
-              <a:rPr dirty="0"/>
-              <a:t>Try to have a good idea about what you’ll be presenting by Saturday night</a:t>
-            </a:r>
-            <a:r>
-              <a:rPr lang="en-US" dirty="0"/>
-              <a:t> – </a:t>
-            </a:r>
-            <a:r>
-              <a:rPr lang="en-US" b="1" dirty="0"/>
-              <a:t>presentations are due Sunday at 1PM</a:t>
-            </a:r>
-            <a:r>
-              <a:rPr lang="en-US" dirty="0"/>
-              <a:t>!</a:t>
-            </a:r>
-            <a:endParaRPr dirty="0"/>
-          </a:p>
-        </p:txBody>
-      </p:sp>
-    </p:spTree>
   </p:cSld>
   <p:clrMapOvr>
     <a:masterClrMapping/>

</xml_diff>

<commit_message>
More intro slide updates.
</commit_message>
<xml_diff>
--- a/admin/intro_slides/hackathon_intro_slides.pptx
+++ b/admin/intro_slides/hackathon_intro_slides.pptx
@@ -2158,7 +2158,7 @@
           </a:ln>
           <a:extLst>
             <a:ext uri="{C572A759-6A51-4108-AA02-DFA0A04FC94B}">
-              <ma14:wrappingTextBoxFlag xmlns="" xmlns:m="http://schemas.openxmlformats.org/officeDocument/2006/math" xmlns:a14="http://schemas.microsoft.com/office/drawing/2010/main" xmlns:ma14="http://schemas.microsoft.com/office/mac/drawingml/2011/main" val="1"/>
+              <ma14:wrappingTextBoxFlag xmlns:ma14="http://schemas.microsoft.com/office/mac/drawingml/2011/main" xmlns:a14="http://schemas.microsoft.com/office/drawing/2010/main" xmlns:m="http://schemas.openxmlformats.org/officeDocument/2006/math" xmlns="" val="1"/>
             </a:ext>
           </a:extLst>
         </p:spPr>
@@ -2197,7 +2197,7 @@
           </a:ln>
           <a:extLst>
             <a:ext uri="{C572A759-6A51-4108-AA02-DFA0A04FC94B}">
-              <ma14:wrappingTextBoxFlag xmlns="" xmlns:m="http://schemas.openxmlformats.org/officeDocument/2006/math" xmlns:a14="http://schemas.microsoft.com/office/drawing/2010/main" xmlns:ma14="http://schemas.microsoft.com/office/mac/drawingml/2011/main" val="1"/>
+              <ma14:wrappingTextBoxFlag xmlns:ma14="http://schemas.microsoft.com/office/mac/drawingml/2011/main" xmlns:a14="http://schemas.microsoft.com/office/drawing/2010/main" xmlns:m="http://schemas.openxmlformats.org/officeDocument/2006/math" xmlns="" val="1"/>
             </a:ext>
           </a:extLst>
         </p:spPr>
@@ -3198,7 +3198,7 @@
           </a:ln>
           <a:extLst>
             <a:ext uri="{C572A759-6A51-4108-AA02-DFA0A04FC94B}">
-              <ma14:wrappingTextBoxFlag xmlns="" xmlns:m="http://schemas.openxmlformats.org/officeDocument/2006/math" xmlns:a14="http://schemas.microsoft.com/office/drawing/2010/main" xmlns:ma14="http://schemas.microsoft.com/office/mac/drawingml/2011/main" val="1"/>
+              <ma14:wrappingTextBoxFlag xmlns:ma14="http://schemas.microsoft.com/office/mac/drawingml/2011/main" xmlns:a14="http://schemas.microsoft.com/office/drawing/2010/main" xmlns:m="http://schemas.openxmlformats.org/officeDocument/2006/math" xmlns="" val="1"/>
             </a:ext>
           </a:extLst>
         </p:spPr>
@@ -3560,7 +3560,7 @@
           </a:ln>
           <a:extLst>
             <a:ext uri="{C572A759-6A51-4108-AA02-DFA0A04FC94B}">
-              <ma14:wrappingTextBoxFlag xmlns="" xmlns:m="http://schemas.openxmlformats.org/officeDocument/2006/math" xmlns:a14="http://schemas.microsoft.com/office/drawing/2010/main" xmlns:ma14="http://schemas.microsoft.com/office/mac/drawingml/2011/main" val="1"/>
+              <ma14:wrappingTextBoxFlag xmlns:ma14="http://schemas.microsoft.com/office/mac/drawingml/2011/main" xmlns:a14="http://schemas.microsoft.com/office/drawing/2010/main" xmlns:m="http://schemas.openxmlformats.org/officeDocument/2006/math" xmlns="" val="1"/>
             </a:ext>
           </a:extLst>
         </p:spPr>
@@ -3650,7 +3650,7 @@
           </a:ln>
           <a:extLst>
             <a:ext uri="{C572A759-6A51-4108-AA02-DFA0A04FC94B}">
-              <ma14:wrappingTextBoxFlag xmlns="" xmlns:m="http://schemas.openxmlformats.org/officeDocument/2006/math" xmlns:a14="http://schemas.microsoft.com/office/drawing/2010/main" xmlns:ma14="http://schemas.microsoft.com/office/mac/drawingml/2011/main" val="1"/>
+              <ma14:wrappingTextBoxFlag xmlns:ma14="http://schemas.microsoft.com/office/mac/drawingml/2011/main" xmlns:a14="http://schemas.microsoft.com/office/drawing/2010/main" xmlns:m="http://schemas.openxmlformats.org/officeDocument/2006/math" xmlns="" val="1"/>
             </a:ext>
           </a:extLst>
         </p:spPr>
@@ -3685,7 +3685,7 @@
           </a:ln>
           <a:extLst>
             <a:ext uri="{C572A759-6A51-4108-AA02-DFA0A04FC94B}">
-              <ma14:wrappingTextBoxFlag xmlns="" xmlns:m="http://schemas.openxmlformats.org/officeDocument/2006/math" xmlns:a14="http://schemas.microsoft.com/office/drawing/2010/main" xmlns:ma14="http://schemas.microsoft.com/office/mac/drawingml/2011/main" val="1"/>
+              <ma14:wrappingTextBoxFlag xmlns:ma14="http://schemas.microsoft.com/office/mac/drawingml/2011/main" xmlns:a14="http://schemas.microsoft.com/office/drawing/2010/main" xmlns:m="http://schemas.openxmlformats.org/officeDocument/2006/math" xmlns="" val="1"/>
             </a:ext>
           </a:extLst>
         </p:spPr>
@@ -4040,7 +4040,7 @@
           </a:ln>
           <a:extLst>
             <a:ext uri="{C572A759-6A51-4108-AA02-DFA0A04FC94B}">
-              <ma14:wrappingTextBoxFlag xmlns="" xmlns:m="http://schemas.openxmlformats.org/officeDocument/2006/math" xmlns:a14="http://schemas.microsoft.com/office/drawing/2010/main" xmlns:ma14="http://schemas.microsoft.com/office/mac/drawingml/2011/main" val="1"/>
+              <ma14:wrappingTextBoxFlag xmlns:ma14="http://schemas.microsoft.com/office/mac/drawingml/2011/main" xmlns:a14="http://schemas.microsoft.com/office/drawing/2010/main" xmlns:m="http://schemas.openxmlformats.org/officeDocument/2006/math" xmlns="" val="1"/>
             </a:ext>
           </a:extLst>
         </p:spPr>
@@ -4120,10 +4120,10 @@
       </p:sp>
       <p:pic>
         <p:nvPicPr>
-          <p:cNvPr id="3" name="Picture 2" descr="Table&#10;&#10;Description automatically generated">
+          <p:cNvPr id="4" name="Picture 3" descr="Table&#10;&#10;Description automatically generated">
             <a:extLst>
               <a:ext uri="{FF2B5EF4-FFF2-40B4-BE49-F238E27FC236}">
-                <a16:creationId xmlns:a16="http://schemas.microsoft.com/office/drawing/2014/main" id="{3059A8AC-5445-D249-B7DB-97F1B358F054}"/>
+                <a16:creationId xmlns:a16="http://schemas.microsoft.com/office/drawing/2014/main" id="{7513FFEB-D8B3-D84F-8B4B-E9FA159E927B}"/>
               </a:ext>
             </a:extLst>
           </p:cNvPr>
@@ -4146,8 +4146,8 @@
         </p:blipFill>
         <p:spPr>
           <a:xfrm>
-            <a:off x="1149350" y="2207198"/>
-            <a:ext cx="10706100" cy="6718300"/>
+            <a:off x="952500" y="2413000"/>
+            <a:ext cx="10985500" cy="5537200"/>
           </a:xfrm>
           <a:prstGeom prst="rect">
             <a:avLst/>

</xml_diff>